<commit_message>
add lint to slide
</commit_message>
<xml_diff>
--- a/g10.pptx
+++ b/g10.pptx
@@ -19,6 +19,8 @@
     <p:sldId id="270" r:id="rId13"/>
     <p:sldId id="271" r:id="rId14"/>
     <p:sldId id="273" r:id="rId15"/>
+    <p:sldId id="274" r:id="rId16"/>
+    <p:sldId id="275" r:id="rId17"/>
   </p:sldIdLst>
   <p:sldSz cx="9144000" cy="6858000" type="screen4x3"/>
   <p:notesSz cx="6858000" cy="9144000"/>
@@ -258,7 +260,7 @@
             <a:fld id="{1D8BD707-D9CF-40AE-B4C6-C98DA3205C09}" type="datetimeFigureOut">
               <a:rPr lang="en-US" smtClean="0"/>
               <a:pPr/>
-              <a:t>5/15/2014</a:t>
+              <a:t>5/21/2014</a:t>
             </a:fld>
             <a:endParaRPr lang="en-US"/>
           </a:p>
@@ -1129,7 +1131,7 @@
             <a:fld id="{1D8BD707-D9CF-40AE-B4C6-C98DA3205C09}" type="datetimeFigureOut">
               <a:rPr lang="en-US" smtClean="0"/>
               <a:pPr/>
-              <a:t>5/15/2014</a:t>
+              <a:t>5/21/2014</a:t>
             </a:fld>
             <a:endParaRPr lang="en-US"/>
           </a:p>
@@ -1306,7 +1308,7 @@
             <a:fld id="{1D8BD707-D9CF-40AE-B4C6-C98DA3205C09}" type="datetimeFigureOut">
               <a:rPr lang="en-US" smtClean="0"/>
               <a:pPr/>
-              <a:t>5/15/2014</a:t>
+              <a:t>5/21/2014</a:t>
             </a:fld>
             <a:endParaRPr lang="en-US"/>
           </a:p>
@@ -1478,7 +1480,7 @@
             <a:fld id="{1D8BD707-D9CF-40AE-B4C6-C98DA3205C09}" type="datetimeFigureOut">
               <a:rPr lang="en-US" smtClean="0"/>
               <a:pPr/>
-              <a:t>5/15/2014</a:t>
+              <a:t>5/21/2014</a:t>
             </a:fld>
             <a:endParaRPr lang="en-US"/>
           </a:p>
@@ -1690,7 +1692,7 @@
             <a:fld id="{1D8BD707-D9CF-40AE-B4C6-C98DA3205C09}" type="datetimeFigureOut">
               <a:rPr lang="en-US" smtClean="0"/>
               <a:pPr/>
-              <a:t>5/15/2014</a:t>
+              <a:t>5/21/2014</a:t>
             </a:fld>
             <a:endParaRPr lang="en-US"/>
           </a:p>
@@ -2506,7 +2508,7 @@
             <a:fld id="{1D8BD707-D9CF-40AE-B4C6-C98DA3205C09}" type="datetimeFigureOut">
               <a:rPr lang="en-US" smtClean="0"/>
               <a:pPr/>
-              <a:t>5/15/2014</a:t>
+              <a:t>5/21/2014</a:t>
             </a:fld>
             <a:endParaRPr lang="en-US"/>
           </a:p>
@@ -2744,7 +2746,7 @@
             <a:fld id="{1D8BD707-D9CF-40AE-B4C6-C98DA3205C09}" type="datetimeFigureOut">
               <a:rPr lang="en-US" smtClean="0"/>
               <a:pPr/>
-              <a:t>5/15/2014</a:t>
+              <a:t>5/21/2014</a:t>
             </a:fld>
             <a:endParaRPr lang="en-US"/>
           </a:p>
@@ -3069,7 +3071,7 @@
             <a:fld id="{1D8BD707-D9CF-40AE-B4C6-C98DA3205C09}" type="datetimeFigureOut">
               <a:rPr lang="en-US" smtClean="0"/>
               <a:pPr/>
-              <a:t>5/15/2014</a:t>
+              <a:t>5/21/2014</a:t>
             </a:fld>
             <a:endParaRPr lang="en-US"/>
           </a:p>
@@ -3161,7 +3163,7 @@
             <a:fld id="{1D8BD707-D9CF-40AE-B4C6-C98DA3205C09}" type="datetimeFigureOut">
               <a:rPr lang="en-US" smtClean="0"/>
               <a:pPr/>
-              <a:t>5/15/2014</a:t>
+              <a:t>5/21/2014</a:t>
             </a:fld>
             <a:endParaRPr lang="en-US"/>
           </a:p>
@@ -3680,7 +3682,7 @@
             <a:fld id="{1D8BD707-D9CF-40AE-B4C6-C98DA3205C09}" type="datetimeFigureOut">
               <a:rPr lang="en-US" smtClean="0"/>
               <a:pPr/>
-              <a:t>5/15/2014</a:t>
+              <a:t>5/21/2014</a:t>
             </a:fld>
             <a:endParaRPr lang="en-US"/>
           </a:p>
@@ -4193,7 +4195,7 @@
             <a:fld id="{1D8BD707-D9CF-40AE-B4C6-C98DA3205C09}" type="datetimeFigureOut">
               <a:rPr lang="en-US" smtClean="0"/>
               <a:pPr/>
-              <a:t>5/15/2014</a:t>
+              <a:t>5/21/2014</a:t>
             </a:fld>
             <a:endParaRPr lang="en-US"/>
           </a:p>
@@ -4440,7 +4442,7 @@
             <a:fld id="{1D8BD707-D9CF-40AE-B4C6-C98DA3205C09}" type="datetimeFigureOut">
               <a:rPr lang="en-US" smtClean="0"/>
               <a:pPr/>
-              <a:t>5/15/2014</a:t>
+              <a:t>5/21/2014</a:t>
             </a:fld>
             <a:endParaRPr lang="en-US"/>
           </a:p>
@@ -6188,6 +6190,176 @@
 </p:sld>
 </file>
 
+<file path=ppt/slides/slide15.xml><?xml version="1.0" encoding="utf-8"?>
+<p:sld xmlns:a="http://schemas.openxmlformats.org/drawingml/2006/main" xmlns:r="http://schemas.openxmlformats.org/officeDocument/2006/relationships" xmlns:p="http://schemas.openxmlformats.org/presentationml/2006/main">
+  <p:cSld>
+    <p:spTree>
+      <p:nvGrpSpPr>
+        <p:cNvPr id="1" name=""/>
+        <p:cNvGrpSpPr/>
+        <p:nvPr/>
+      </p:nvGrpSpPr>
+      <p:grpSpPr>
+        <a:xfrm>
+          <a:off x="0" y="0"/>
+          <a:ext cx="0" cy="0"/>
+          <a:chOff x="0" y="0"/>
+          <a:chExt cx="0" cy="0"/>
+        </a:xfrm>
+      </p:grpSpPr>
+      <p:sp>
+        <p:nvSpPr>
+          <p:cNvPr id="2" name="Title 1"/>
+          <p:cNvSpPr>
+            <a:spLocks noGrp="1"/>
+          </p:cNvSpPr>
+          <p:nvPr>
+            <p:ph type="title"/>
+          </p:nvPr>
+        </p:nvSpPr>
+        <p:spPr/>
+        <p:txBody>
+          <a:bodyPr/>
+          <a:lstStyle/>
+          <a:p>
+            <a:r>
+              <a:rPr lang="en-US" dirty="0" err="1" smtClean="0"/>
+              <a:t>Mindmap</a:t>
+            </a:r>
+            <a:endParaRPr lang="vi-VN" dirty="0"/>
+          </a:p>
+        </p:txBody>
+      </p:sp>
+      <p:sp>
+        <p:nvSpPr>
+          <p:cNvPr id="3" name="Content Placeholder 2"/>
+          <p:cNvSpPr>
+            <a:spLocks noGrp="1"/>
+          </p:cNvSpPr>
+          <p:nvPr>
+            <p:ph sz="quarter" idx="1"/>
+          </p:nvPr>
+        </p:nvSpPr>
+        <p:spPr/>
+        <p:txBody>
+          <a:bodyPr>
+            <a:normAutofit/>
+          </a:bodyPr>
+          <a:lstStyle/>
+          <a:p>
+            <a:r>
+              <a:rPr lang="en-US" sz="2000" dirty="0" smtClean="0"/>
+              <a:t>Using Lint for Ruby on Rails</a:t>
+            </a:r>
+          </a:p>
+          <a:p>
+            <a:endParaRPr lang="vi-VN" sz="2000" dirty="0"/>
+          </a:p>
+        </p:txBody>
+      </p:sp>
+      <p:pic>
+        <p:nvPicPr>
+          <p:cNvPr id="4" name="Picture 3" descr="javascript_before.png"/>
+          <p:cNvPicPr>
+            <a:picLocks noChangeAspect="1"/>
+          </p:cNvPicPr>
+          <p:nvPr/>
+        </p:nvPicPr>
+        <p:blipFill>
+          <a:blip r:embed="rId2"/>
+          <a:stretch>
+            <a:fillRect/>
+          </a:stretch>
+        </p:blipFill>
+        <p:spPr>
+          <a:xfrm>
+            <a:off x="457200" y="1981200"/>
+            <a:ext cx="8001000" cy="4686954"/>
+          </a:xfrm>
+          <a:prstGeom prst="rect">
+            <a:avLst/>
+          </a:prstGeom>
+        </p:spPr>
+      </p:pic>
+    </p:spTree>
+  </p:cSld>
+  <p:clrMapOvr>
+    <a:masterClrMapping/>
+  </p:clrMapOvr>
+</p:sld>
+</file>
+
+<file path=ppt/slides/slide16.xml><?xml version="1.0" encoding="utf-8"?>
+<p:sld xmlns:a="http://schemas.openxmlformats.org/drawingml/2006/main" xmlns:r="http://schemas.openxmlformats.org/officeDocument/2006/relationships" xmlns:p="http://schemas.openxmlformats.org/presentationml/2006/main">
+  <p:cSld>
+    <p:spTree>
+      <p:nvGrpSpPr>
+        <p:cNvPr id="1" name=""/>
+        <p:cNvGrpSpPr/>
+        <p:nvPr/>
+      </p:nvGrpSpPr>
+      <p:grpSpPr>
+        <a:xfrm>
+          <a:off x="0" y="0"/>
+          <a:ext cx="0" cy="0"/>
+          <a:chOff x="0" y="0"/>
+          <a:chExt cx="0" cy="0"/>
+        </a:xfrm>
+      </p:grpSpPr>
+      <p:sp>
+        <p:nvSpPr>
+          <p:cNvPr id="2" name="Title 1"/>
+          <p:cNvSpPr>
+            <a:spLocks noGrp="1"/>
+          </p:cNvSpPr>
+          <p:nvPr>
+            <p:ph type="title"/>
+          </p:nvPr>
+        </p:nvSpPr>
+        <p:spPr/>
+        <p:txBody>
+          <a:bodyPr/>
+          <a:lstStyle/>
+          <a:p>
+            <a:r>
+              <a:rPr lang="en-US" dirty="0" err="1" smtClean="0"/>
+              <a:t>Mindmap</a:t>
+            </a:r>
+            <a:endParaRPr lang="vi-VN" dirty="0"/>
+          </a:p>
+        </p:txBody>
+      </p:sp>
+      <p:pic>
+        <p:nvPicPr>
+          <p:cNvPr id="4" name="Content Placeholder 3" descr="javascript_after.png"/>
+          <p:cNvPicPr>
+            <a:picLocks noGrp="1" noChangeAspect="1"/>
+          </p:cNvPicPr>
+          <p:nvPr>
+            <p:ph sz="quarter" idx="1"/>
+          </p:nvPr>
+        </p:nvPicPr>
+        <p:blipFill>
+          <a:blip r:embed="rId2"/>
+          <a:stretch>
+            <a:fillRect/>
+          </a:stretch>
+        </p:blipFill>
+        <p:spPr>
+          <a:xfrm>
+            <a:off x="585284" y="1693535"/>
+            <a:ext cx="7211432" cy="4686954"/>
+          </a:xfrm>
+        </p:spPr>
+      </p:pic>
+    </p:spTree>
+  </p:cSld>
+  <p:clrMapOvr>
+    <a:masterClrMapping/>
+  </p:clrMapOvr>
+</p:sld>
+</file>
+
 <file path=ppt/slides/slide2.xml><?xml version="1.0" encoding="utf-8"?>
 <p:sld xmlns:a="http://schemas.openxmlformats.org/drawingml/2006/main" xmlns:r="http://schemas.openxmlformats.org/officeDocument/2006/relationships" xmlns:p="http://schemas.openxmlformats.org/presentationml/2006/main">
   <p:cSld>

</xml_diff>